<commit_message>
Removed PKI from Friday's programme
</commit_message>
<xml_diff>
--- a/slides/00_administrativa.pptx
+++ b/slides/00_administrativa.pptx
@@ -3670,7 +3670,7 @@
                 <a:spcPct val="100000"/>
               </a:lnSpc>
             </a:pPr>
-            <a:fld id="{51E59084-04CC-4F8A-8BB2-F64AFC111938}" type="slidenum">
+            <a:fld id="{EF27669A-8C09-4E80-B9C8-4B2E7517BE4B}" type="slidenum">
               <a:rPr b="1" lang="en-US" sz="1400">
                 <a:solidFill>
                   <a:srgbClr val="ffffff"/>
@@ -4256,7 +4256,7 @@
                 <a:spcPct val="100000"/>
               </a:lnSpc>
             </a:pPr>
-            <a:fld id="{6D8B749A-59B8-407E-8247-CABCC651DF5A}" type="slidenum">
+            <a:fld id="{3326D112-88C0-4C4A-A5D3-9C6D2928DD19}" type="slidenum">
               <a:rPr b="1" lang="en-US" sz="1400">
                 <a:solidFill>
                   <a:srgbClr val="ffffff"/>
@@ -5220,7 +5220,7 @@
                 <a:spcPct val="100000"/>
               </a:lnSpc>
             </a:pPr>
-            <a:fld id="{C9C3536B-ED79-4E0C-9C3C-45F383FDFA2D}" type="slidenum">
+            <a:fld id="{B321247D-25DC-4CB7-80DE-74F17D7DF554}" type="slidenum">
               <a:rPr b="1" lang="en-US" sz="2400">
                 <a:solidFill>
                   <a:srgbClr val="ffffff"/>
@@ -6420,26 +6420,6 @@
                 <a:latin typeface="Arial"/>
               </a:rPr>
               <a:t>Βασικές έννοιες κρυπτογραφίας</a:t>
-            </a:r>
-            <a:endParaRPr/>
-          </a:p>
-          <a:p>
-            <a:pPr>
-              <a:lnSpc>
-                <a:spcPct val="100000"/>
-              </a:lnSpc>
-              <a:buSzPct val="25000"/>
-              <a:buFont typeface="Arial"/>
-              <a:buChar char="•"/>
-            </a:pPr>
-            <a:r>
-              <a:rPr lang="en-US" sz="3200">
-                <a:solidFill>
-                  <a:srgbClr val="292934"/>
-                </a:solidFill>
-                <a:latin typeface="Arial"/>
-              </a:rPr>
-              <a:t>PKI</a:t>
             </a:r>
             <a:endParaRPr/>
           </a:p>

</xml_diff>